<commit_message>
c# dynamic, object init a anonymni trida
</commit_message>
<xml_diff>
--- a/prezentace.pptx
+++ b/prezentace.pptx
@@ -7668,7 +7668,23 @@
             </a:r>
             <a:r>
               <a:rPr lang="cs-CZ" dirty="0" smtClean="0"/>
-              <a:t> – příklad</a:t>
+              <a:t>, </a:t>
+            </a:r>
+            <a:r>
+              <a:rPr lang="cs-CZ" b="1" dirty="0" err="1" smtClean="0"/>
+              <a:t>dynamic</a:t>
+            </a:r>
+            <a:r>
+              <a:rPr lang="cs-CZ" dirty="0" smtClean="0"/>
+              <a:t>, </a:t>
+            </a:r>
+            <a:r>
+              <a:rPr lang="cs-CZ" smtClean="0"/>
+              <a:t>a anonymní třída </a:t>
+            </a:r>
+            <a:r>
+              <a:rPr lang="cs-CZ" dirty="0" smtClean="0"/>
+              <a:t>– příklad</a:t>
             </a:r>
           </a:p>
           <a:p>

</xml_diff>

<commit_message>
doplneni C# casti prezentace
</commit_message>
<xml_diff>
--- a/prezentace.pptx
+++ b/prezentace.pptx
@@ -5,10 +5,10 @@
     <p:sldMasterId id="2147483648" r:id="rId1"/>
   </p:sldMasterIdLst>
   <p:notesMasterIdLst>
-    <p:notesMasterId r:id="rId23"/>
+    <p:notesMasterId r:id="rId24"/>
   </p:notesMasterIdLst>
   <p:handoutMasterIdLst>
-    <p:handoutMasterId r:id="rId24"/>
+    <p:handoutMasterId r:id="rId25"/>
   </p:handoutMasterIdLst>
   <p:sldIdLst>
     <p:sldId id="259" r:id="rId2"/>
@@ -23,15 +23,16 @@
     <p:sldId id="289" r:id="rId11"/>
     <p:sldId id="290" r:id="rId12"/>
     <p:sldId id="291" r:id="rId13"/>
-    <p:sldId id="292" r:id="rId14"/>
-    <p:sldId id="293" r:id="rId15"/>
-    <p:sldId id="294" r:id="rId16"/>
+    <p:sldId id="293" r:id="rId14"/>
+    <p:sldId id="294" r:id="rId15"/>
+    <p:sldId id="292" r:id="rId16"/>
     <p:sldId id="295" r:id="rId17"/>
     <p:sldId id="281" r:id="rId18"/>
-    <p:sldId id="282" r:id="rId19"/>
-    <p:sldId id="283" r:id="rId20"/>
-    <p:sldId id="280" r:id="rId21"/>
-    <p:sldId id="277" r:id="rId22"/>
+    <p:sldId id="296" r:id="rId19"/>
+    <p:sldId id="282" r:id="rId20"/>
+    <p:sldId id="283" r:id="rId21"/>
+    <p:sldId id="280" r:id="rId22"/>
+    <p:sldId id="277" r:id="rId23"/>
   </p:sldIdLst>
   <p:sldSz cx="9144000" cy="6858000" type="screen4x3"/>
   <p:notesSz cx="6858000" cy="9144000"/>
@@ -155,15 +156,16 @@
             <p14:sldId id="289"/>
             <p14:sldId id="290"/>
             <p14:sldId id="291"/>
-            <p14:sldId id="292"/>
             <p14:sldId id="293"/>
             <p14:sldId id="294"/>
+            <p14:sldId id="292"/>
             <p14:sldId id="295"/>
           </p14:sldIdLst>
         </p14:section>
         <p14:section name=".NET core Knihovny" id="{A90CCB4D-62F7-45B2-8BD4-70C86AD1CB5C}">
           <p14:sldIdLst>
             <p14:sldId id="281"/>
+            <p14:sldId id="296"/>
             <p14:sldId id="282"/>
             <p14:sldId id="283"/>
           </p14:sldIdLst>
@@ -2447,6 +2449,129 @@
       </p:grpSpPr>
       <p:sp>
         <p:nvSpPr>
+          <p:cNvPr id="2" name="Slide Image Placeholder 1"/>
+          <p:cNvSpPr>
+            <a:spLocks noGrp="1" noRot="1" noChangeAspect="1"/>
+          </p:cNvSpPr>
+          <p:nvPr>
+            <p:ph type="sldImg"/>
+          </p:nvPr>
+        </p:nvSpPr>
+        <p:spPr/>
+      </p:sp>
+      <p:sp>
+        <p:nvSpPr>
+          <p:cNvPr id="3" name="Notes Placeholder 2"/>
+          <p:cNvSpPr>
+            <a:spLocks noGrp="1"/>
+          </p:cNvSpPr>
+          <p:nvPr>
+            <p:ph type="body" idx="1"/>
+          </p:nvPr>
+        </p:nvSpPr>
+        <p:spPr/>
+        <p:txBody>
+          <a:bodyPr>
+            <a:normAutofit/>
+          </a:bodyPr>
+          <a:lstStyle/>
+          <a:p>
+            <a:pPr>
+              <a:lnSpc>
+                <a:spcPct val="80000"/>
+              </a:lnSpc>
+            </a:pPr>
+            <a:r>
+              <a:rPr lang="en-US" dirty="0" smtClean="0"/>
+              <a:t>Give a brief overview of the presentation.</a:t>
+            </a:r>
+            <a:r>
+              <a:rPr lang="en-US" baseline="0" dirty="0" smtClean="0"/>
+              <a:t> D</a:t>
+            </a:r>
+            <a:r>
+              <a:rPr lang="en-US" dirty="0" smtClean="0"/>
+              <a:t>escribe the major focus of the presentation and why it is important.</a:t>
+            </a:r>
+          </a:p>
+          <a:p>
+            <a:pPr>
+              <a:lnSpc>
+                <a:spcPct val="80000"/>
+              </a:lnSpc>
+            </a:pPr>
+            <a:r>
+              <a:rPr lang="en-US" dirty="0" smtClean="0"/>
+              <a:t>Introduce each of the major topics.</a:t>
+            </a:r>
+          </a:p>
+          <a:p>
+            <a:r>
+              <a:rPr lang="en-US" dirty="0" smtClean="0"/>
+              <a:t>To provide a road map for the audience, you</a:t>
+            </a:r>
+            <a:r>
+              <a:rPr lang="en-US" baseline="0" dirty="0" smtClean="0"/>
+              <a:t> can </a:t>
+            </a:r>
+            <a:r>
+              <a:rPr lang="en-US" dirty="0" smtClean="0"/>
+              <a:t>repeat this Overview slide throughout the presentation, highlighting the particular topic you will discuss next.</a:t>
+            </a:r>
+          </a:p>
+        </p:txBody>
+      </p:sp>
+      <p:sp>
+        <p:nvSpPr>
+          <p:cNvPr id="4" name="Slide Number Placeholder 3"/>
+          <p:cNvSpPr>
+            <a:spLocks noGrp="1"/>
+          </p:cNvSpPr>
+          <p:nvPr>
+            <p:ph type="sldNum" sz="quarter" idx="10"/>
+          </p:nvPr>
+        </p:nvSpPr>
+        <p:spPr/>
+        <p:txBody>
+          <a:bodyPr/>
+          <a:lstStyle/>
+          <a:p>
+            <a:fld id="{EC6EAC7D-5A89-47C2-8ABA-56C9C2DEF7A4}" type="slidenum">
+              <a:rPr lang="en-US" smtClean="0"/>
+              <a:pPr/>
+              <a:t>21</a:t>
+            </a:fld>
+            <a:endParaRPr lang="en-US"/>
+          </a:p>
+        </p:txBody>
+      </p:sp>
+    </p:spTree>
+  </p:cSld>
+  <p:clrMapOvr>
+    <a:masterClrMapping/>
+  </p:clrMapOvr>
+</p:notes>
+</file>
+
+<file path=ppt/notesSlides/notesSlide22.xml><?xml version="1.0" encoding="utf-8"?>
+<p:notes xmlns:a="http://schemas.openxmlformats.org/drawingml/2006/main" xmlns:r="http://schemas.openxmlformats.org/officeDocument/2006/relationships" xmlns:p="http://schemas.openxmlformats.org/presentationml/2006/main">
+  <p:cSld>
+    <p:spTree>
+      <p:nvGrpSpPr>
+        <p:cNvPr id="1" name=""/>
+        <p:cNvGrpSpPr/>
+        <p:nvPr/>
+      </p:nvGrpSpPr>
+      <p:grpSpPr>
+        <a:xfrm>
+          <a:off x="0" y="0"/>
+          <a:ext cx="0" cy="0"/>
+          <a:chOff x="0" y="0"/>
+          <a:chExt cx="0" cy="0"/>
+        </a:xfrm>
+      </p:grpSpPr>
+      <p:sp>
+        <p:nvSpPr>
           <p:cNvPr id="41986" name="Rectangle 23"/>
           <p:cNvSpPr>
             <a:spLocks noGrp="1" noChangeArrowheads="1"/>
@@ -2518,7 +2643,7 @@
             <a:fld id="{B2B44A5F-6CE4-493C-A0D7-6834FF76660C}" type="slidenum">
               <a:rPr lang="en-US" smtClean="0"/>
               <a:pPr/>
-              <a:t>21</a:t>
+              <a:t>22</a:t>
             </a:fld>
             <a:endParaRPr lang="en-US" dirty="0" smtClean="0"/>
           </a:p>
@@ -8123,31 +8248,15 @@
           <a:p>
             <a:r>
               <a:rPr lang="cs-CZ" dirty="0" smtClean="0"/>
-              <a:t>E</a:t>
+              <a:t>D</a:t>
             </a:r>
             <a:r>
               <a:rPr lang="en-US" dirty="0" err="1" smtClean="0"/>
-              <a:t>venty</a:t>
-            </a:r>
-            <a:r>
-              <a:rPr lang="en-US" dirty="0" smtClean="0"/>
-              <a:t> </a:t>
-            </a:r>
-            <a:r>
-              <a:rPr lang="en-US" dirty="0" err="1" smtClean="0"/>
-              <a:t>delagaty</a:t>
-            </a:r>
-            <a:r>
-              <a:rPr lang="cs-CZ" dirty="0" smtClean="0"/>
-              <a:t> a</a:t>
-            </a:r>
-            <a:r>
-              <a:rPr lang="en-US" dirty="0" smtClean="0"/>
-              <a:t> </a:t>
+              <a:t>estruktur</a:t>
             </a:r>
             <a:r>
               <a:rPr lang="en-US" dirty="0"/>
-              <a:t>closure</a:t>
+              <a:t>, using a IDispose</a:t>
             </a:r>
           </a:p>
         </p:txBody>
@@ -8180,8 +8289,118 @@
             <a:pPr marL="514350" indent="-457200" fontAlgn="base"/>
             <a:r>
               <a:rPr lang="cs-CZ" dirty="0" smtClean="0"/>
-              <a:t>dopsat</a:t>
-            </a:r>
+              <a:t>Chování destruktoru jako v </a:t>
+            </a:r>
+            <a:r>
+              <a:rPr lang="cs-CZ" dirty="0" err="1" smtClean="0"/>
+              <a:t>jave</a:t>
+            </a:r>
+            <a:r>
+              <a:rPr lang="cs-CZ" dirty="0" smtClean="0"/>
+              <a:t> </a:t>
+            </a:r>
+            <a:r>
+              <a:rPr lang="cs-CZ" dirty="0" err="1" smtClean="0"/>
+              <a:t>finalize</a:t>
+            </a:r>
+            <a:r>
+              <a:rPr lang="cs-CZ" dirty="0" smtClean="0"/>
+              <a:t> ale je zaručeno že se  volá vždy při uvolňování.</a:t>
+            </a:r>
+          </a:p>
+          <a:p>
+            <a:pPr marL="514350" indent="-457200" fontAlgn="base"/>
+            <a:r>
+              <a:rPr lang="en-US" dirty="0" err="1" smtClean="0"/>
+              <a:t>Idispose</a:t>
+            </a:r>
+            <a:r>
+              <a:rPr lang="cs-CZ" dirty="0" smtClean="0"/>
+              <a:t> je pro explicitní </a:t>
+            </a:r>
+            <a:r>
+              <a:rPr lang="cs-CZ" dirty="0" err="1" smtClean="0"/>
+              <a:t>uvolnování</a:t>
+            </a:r>
+            <a:r>
+              <a:rPr lang="cs-CZ" dirty="0" smtClean="0"/>
+              <a:t> </a:t>
+            </a:r>
+            <a:r>
+              <a:rPr lang="cs-CZ" dirty="0" err="1" smtClean="0"/>
+              <a:t>unmanaged</a:t>
+            </a:r>
+            <a:r>
+              <a:rPr lang="cs-CZ" dirty="0" smtClean="0"/>
+              <a:t> </a:t>
+            </a:r>
+            <a:r>
+              <a:rPr lang="cs-CZ" dirty="0" err="1" smtClean="0"/>
+              <a:t>zdroju</a:t>
+            </a:r>
+            <a:r>
+              <a:rPr lang="cs-CZ" dirty="0" smtClean="0"/>
+              <a:t> </a:t>
+            </a:r>
+            <a:r>
+              <a:rPr lang="cs-CZ" dirty="0" err="1" smtClean="0"/>
+              <a:t>např</a:t>
+            </a:r>
+            <a:r>
+              <a:rPr lang="cs-CZ" dirty="0" smtClean="0"/>
+              <a:t>, souborů, </a:t>
+            </a:r>
+            <a:r>
+              <a:rPr lang="cs-CZ" dirty="0" err="1" smtClean="0"/>
+              <a:t>connections</a:t>
+            </a:r>
+            <a:r>
+              <a:rPr lang="cs-CZ" dirty="0" smtClean="0"/>
+              <a:t> apod.</a:t>
+            </a:r>
+          </a:p>
+          <a:p>
+            <a:pPr marL="514350" indent="-457200" fontAlgn="base"/>
+            <a:r>
+              <a:rPr lang="cs-CZ" dirty="0" smtClean="0"/>
+              <a:t>Místo </a:t>
+            </a:r>
+            <a:r>
+              <a:rPr lang="cs-CZ" dirty="0" err="1" smtClean="0"/>
+              <a:t>try</a:t>
+            </a:r>
+            <a:r>
+              <a:rPr lang="cs-CZ" dirty="0" smtClean="0"/>
+              <a:t> </a:t>
+            </a:r>
+            <a:r>
+              <a:rPr lang="cs-CZ" dirty="0" err="1" smtClean="0"/>
+              <a:t>finaly</a:t>
+            </a:r>
+            <a:r>
+              <a:rPr lang="cs-CZ" dirty="0" smtClean="0"/>
+              <a:t> -&gt; používat </a:t>
+            </a:r>
+            <a:r>
+              <a:rPr lang="cs-CZ" dirty="0" err="1" smtClean="0"/>
+              <a:t>using</a:t>
+            </a:r>
+            <a:endParaRPr lang="cs-CZ" dirty="0" smtClean="0"/>
+          </a:p>
+          <a:p>
+            <a:pPr marL="514350" indent="-457200" fontAlgn="base"/>
+            <a:r>
+              <a:rPr lang="cs-CZ" dirty="0" smtClean="0"/>
+              <a:t>Příklad. </a:t>
+            </a:r>
+            <a:r>
+              <a:rPr lang="en-US" dirty="0" err="1"/>
+              <a:t>TestDispose</a:t>
+            </a:r>
+            <a:endParaRPr lang="en-US" dirty="0"/>
+          </a:p>
+          <a:p>
+            <a:pPr marL="514350" indent="-457200" fontAlgn="base"/>
             <a:endParaRPr lang="en-US" dirty="0"/>
           </a:p>
           <a:p>
@@ -8244,7 +8463,7 @@
     </p:custDataLst>
     <p:extLst>
       <p:ext uri="{BB962C8B-B14F-4D97-AF65-F5344CB8AC3E}">
-        <p14:creationId xmlns:p14="http://schemas.microsoft.com/office/powerpoint/2010/main" val="518512659"/>
+        <p14:creationId xmlns:p14="http://schemas.microsoft.com/office/powerpoint/2010/main" val="1069292896"/>
       </p:ext>
     </p:extLst>
   </p:cSld>
@@ -8302,16 +8521,20 @@
           <a:lstStyle/>
           <a:p>
             <a:r>
-              <a:rPr lang="cs-CZ" dirty="0" smtClean="0"/>
-              <a:t>D</a:t>
-            </a:r>
-            <a:r>
-              <a:rPr lang="en-US" dirty="0" err="1" smtClean="0"/>
-              <a:t>estruktur</a:t>
+              <a:rPr lang="en-US" b="1" dirty="0" smtClean="0"/>
+              <a:t>yield </a:t>
+            </a:r>
+            <a:r>
+              <a:rPr lang="en-US" b="1" dirty="0"/>
+              <a:t>return</a:t>
             </a:r>
             <a:r>
               <a:rPr lang="en-US" dirty="0"/>
-              <a:t>, using a IDispose</a:t>
+              <a:t> a </a:t>
+            </a:r>
+            <a:r>
+              <a:rPr lang="en-US" b="1" dirty="0"/>
+              <a:t>yield break</a:t>
             </a:r>
           </a:p>
         </p:txBody>
@@ -8337,14 +8560,156 @@
         </p:spPr>
         <p:txBody>
           <a:bodyPr>
-            <a:normAutofit/>
+            <a:normAutofit fontScale="62500" lnSpcReduction="20000"/>
           </a:bodyPr>
           <a:lstStyle/>
           <a:p>
             <a:pPr marL="514350" indent="-457200" fontAlgn="base"/>
             <a:r>
               <a:rPr lang="cs-CZ" dirty="0" smtClean="0"/>
-              <a:t>dopsat</a:t>
+              <a:t>Místo psaní implementace </a:t>
+            </a:r>
+            <a:r>
+              <a:rPr lang="en-US" i="1" dirty="0" err="1"/>
+              <a:t>IEnumerable</a:t>
+            </a:r>
+            <a:r>
+              <a:rPr lang="cs-CZ" dirty="0" smtClean="0"/>
+              <a:t>. Řeší překladač v těle metody.</a:t>
+            </a:r>
+          </a:p>
+          <a:p>
+            <a:pPr marL="514350" indent="-457200" fontAlgn="base"/>
+            <a:r>
+              <a:rPr lang="cs-CZ" dirty="0" err="1" smtClean="0"/>
+              <a:t>yield</a:t>
+            </a:r>
+            <a:r>
+              <a:rPr lang="cs-CZ" dirty="0" smtClean="0"/>
+              <a:t> return vrací další prvek.</a:t>
+            </a:r>
+          </a:p>
+          <a:p>
+            <a:pPr marL="514350" indent="-457200" fontAlgn="base"/>
+            <a:r>
+              <a:rPr lang="cs-CZ" dirty="0" err="1" smtClean="0"/>
+              <a:t>Yield</a:t>
+            </a:r>
+            <a:r>
+              <a:rPr lang="cs-CZ" dirty="0" smtClean="0"/>
+              <a:t> </a:t>
+            </a:r>
+            <a:r>
+              <a:rPr lang="cs-CZ" dirty="0" err="1" smtClean="0"/>
+              <a:t>break</a:t>
+            </a:r>
+            <a:r>
+              <a:rPr lang="cs-CZ" dirty="0"/>
+              <a:t> </a:t>
+            </a:r>
+            <a:r>
+              <a:rPr lang="cs-CZ" dirty="0" smtClean="0"/>
+              <a:t>- už není dostupný další.</a:t>
+            </a:r>
+          </a:p>
+          <a:p>
+            <a:pPr marL="514350" indent="-457200" fontAlgn="base"/>
+            <a:r>
+              <a:rPr lang="cs-CZ" dirty="0" err="1" smtClean="0"/>
+              <a:t>Př</a:t>
+            </a:r>
+            <a:r>
+              <a:rPr lang="cs-CZ" dirty="0" smtClean="0"/>
+              <a:t>: Místo vracení již naplněné kolekce prvku </a:t>
+            </a:r>
+            <a:r>
+              <a:rPr lang="cs-CZ" dirty="0"/>
+              <a:t>(čas. náročnost)</a:t>
+            </a:r>
+            <a:r>
+              <a:rPr lang="cs-CZ" dirty="0" smtClean="0"/>
+              <a:t> vracíme postupně</a:t>
+            </a:r>
+          </a:p>
+          <a:p>
+            <a:pPr marL="514350" indent="-457200" fontAlgn="base"/>
+            <a:r>
+              <a:rPr lang="cs-CZ" dirty="0" smtClean="0"/>
+              <a:t>Pozor při znovu zavolaní metody se znova provede </a:t>
+            </a:r>
+            <a:r>
+              <a:rPr lang="cs-CZ" dirty="0" err="1" smtClean="0"/>
+              <a:t>telo</a:t>
+            </a:r>
+            <a:r>
+              <a:rPr lang="cs-CZ" dirty="0" smtClean="0"/>
+              <a:t> metody</a:t>
+            </a:r>
+          </a:p>
+          <a:p>
+            <a:pPr marL="514350" indent="-457200" fontAlgn="base"/>
+            <a:r>
+              <a:rPr lang="cs-CZ" dirty="0" smtClean="0"/>
+              <a:t>-&gt; </a:t>
+            </a:r>
+            <a:r>
+              <a:rPr lang="cs-CZ" dirty="0" err="1" smtClean="0"/>
+              <a:t>jiz</a:t>
+            </a:r>
+            <a:r>
+              <a:rPr lang="cs-CZ" dirty="0" smtClean="0"/>
+              <a:t> </a:t>
+            </a:r>
+            <a:r>
+              <a:rPr lang="cs-CZ" dirty="0" err="1" smtClean="0"/>
+              <a:t>spocitane</a:t>
+            </a:r>
+            <a:r>
+              <a:rPr lang="cs-CZ" dirty="0" smtClean="0"/>
+              <a:t> </a:t>
+            </a:r>
+            <a:r>
+              <a:rPr lang="cs-CZ" dirty="0" err="1" smtClean="0"/>
+              <a:t>pouzit</a:t>
+            </a:r>
+            <a:r>
+              <a:rPr lang="cs-CZ" dirty="0" smtClean="0"/>
+              <a:t> </a:t>
+            </a:r>
+            <a:r>
+              <a:rPr lang="cs-CZ" dirty="0" err="1" smtClean="0"/>
+              <a:t>ToArray</a:t>
+            </a:r>
+            <a:r>
+              <a:rPr lang="cs-CZ" dirty="0" smtClean="0"/>
+              <a:t> nebo </a:t>
+            </a:r>
+            <a:r>
+              <a:rPr lang="cs-CZ" dirty="0" err="1" smtClean="0"/>
+              <a:t>ToList</a:t>
+            </a:r>
+            <a:r>
+              <a:rPr lang="cs-CZ" dirty="0" smtClean="0"/>
+              <a:t> apod.</a:t>
+            </a:r>
+          </a:p>
+          <a:p>
+            <a:pPr marL="514350" indent="-457200" fontAlgn="base"/>
+            <a:r>
+              <a:rPr lang="cs-CZ" dirty="0" smtClean="0"/>
+              <a:t>Příklad </a:t>
+            </a:r>
+            <a:r>
+              <a:rPr lang="en-US" dirty="0" err="1" smtClean="0"/>
+              <a:t>TestEnumerable</a:t>
+            </a:r>
+            <a:r>
+              <a:rPr lang="cs-CZ" dirty="0" smtClean="0"/>
+              <a:t>.</a:t>
+            </a:r>
+            <a:r>
+              <a:rPr lang="cs-CZ" dirty="0" err="1" smtClean="0"/>
+              <a:t>cs</a:t>
             </a:r>
             <a:endParaRPr lang="en-US" dirty="0"/>
           </a:p>
@@ -8364,6 +8729,20 @@
           </a:p>
           <a:p>
             <a:pPr marL="514350" indent="-457200" fontAlgn="base"/>
+            <a:endParaRPr lang="cs-CZ" dirty="0" smtClean="0"/>
+          </a:p>
+          <a:p>
+            <a:pPr marL="514350" indent="-457200" fontAlgn="base"/>
+            <a:endParaRPr lang="cs-CZ" dirty="0"/>
+          </a:p>
+          <a:p>
+            <a:pPr marL="514350" indent="-457200" fontAlgn="base"/>
+            <a:r>
+              <a:rPr lang="en-US" dirty="0">
+                <a:hlinkClick r:id="rId6"/>
+              </a:rPr>
+              <a:t>http://msdn.microsoft.com/cs-cz/library/9k7k7cf0.aspx</a:t>
+            </a:r>
             <a:endParaRPr lang="en-US" dirty="0"/>
           </a:p>
           <a:p>
@@ -8408,7 +8787,7 @@
     </p:custDataLst>
     <p:extLst>
       <p:ext uri="{BB962C8B-B14F-4D97-AF65-F5344CB8AC3E}">
-        <p14:creationId xmlns:p14="http://schemas.microsoft.com/office/powerpoint/2010/main" val="1069292896"/>
+        <p14:creationId xmlns:p14="http://schemas.microsoft.com/office/powerpoint/2010/main" val="1458288348"/>
       </p:ext>
     </p:extLst>
   </p:cSld>
@@ -8466,20 +8845,36 @@
           <a:lstStyle/>
           <a:p>
             <a:r>
-              <a:rPr lang="en-US" b="1" dirty="0" smtClean="0"/>
-              <a:t>yield </a:t>
-            </a:r>
-            <a:r>
-              <a:rPr lang="en-US" b="1" dirty="0"/>
-              <a:t>return</a:t>
+              <a:rPr lang="cs-CZ" dirty="0" smtClean="0"/>
+              <a:t>E</a:t>
+            </a:r>
+            <a:r>
+              <a:rPr lang="en-US" dirty="0" err="1" smtClean="0"/>
+              <a:t>venty</a:t>
+            </a:r>
+            <a:r>
+              <a:rPr lang="cs-CZ" dirty="0" smtClean="0"/>
+              <a:t>,</a:t>
+            </a:r>
+            <a:r>
+              <a:rPr lang="en-US" dirty="0" smtClean="0"/>
+              <a:t> </a:t>
+            </a:r>
+            <a:r>
+              <a:rPr lang="en-US" dirty="0" err="1" smtClean="0"/>
+              <a:t>delagaty</a:t>
+            </a:r>
+            <a:r>
+              <a:rPr lang="cs-CZ" dirty="0" smtClean="0"/>
+              <a:t> a</a:t>
+            </a:r>
+            <a:r>
+              <a:rPr lang="en-US" dirty="0" smtClean="0"/>
+              <a:t> </a:t>
             </a:r>
             <a:r>
               <a:rPr lang="en-US" dirty="0"/>
-              <a:t> a </a:t>
-            </a:r>
-            <a:r>
-              <a:rPr lang="en-US" b="1" dirty="0"/>
-              <a:t>yield break</a:t>
+              <a:t>closure</a:t>
             </a:r>
           </a:p>
         </p:txBody>
@@ -8511,8 +8906,120 @@
           <a:p>
             <a:pPr marL="514350" indent="-457200" fontAlgn="base"/>
             <a:r>
-              <a:rPr lang="cs-CZ" dirty="0" smtClean="0"/>
-              <a:t>dopsat</a:t>
+              <a:rPr lang="en-US" dirty="0" err="1" smtClean="0"/>
+              <a:t>Delegat</a:t>
+            </a:r>
+            <a:r>
+              <a:rPr lang="cs-CZ" dirty="0" smtClean="0"/>
+              <a:t>y jsou reference na metody</a:t>
+            </a:r>
+            <a:endParaRPr lang="cs-CZ" dirty="0" smtClean="0"/>
+          </a:p>
+          <a:p>
+            <a:pPr marL="514350" indent="-457200" fontAlgn="base"/>
+            <a:r>
+              <a:rPr lang="cs-CZ" dirty="0" smtClean="0"/>
+              <a:t>Příklad </a:t>
+            </a:r>
+            <a:r>
+              <a:rPr lang="en-US" dirty="0" err="1" smtClean="0"/>
+              <a:t>TestClosures</a:t>
+            </a:r>
+            <a:r>
+              <a:rPr lang="cs-CZ" dirty="0" smtClean="0"/>
+              <a:t>.</a:t>
+            </a:r>
+            <a:r>
+              <a:rPr lang="cs-CZ" dirty="0" err="1" smtClean="0"/>
+              <a:t>cs</a:t>
+            </a:r>
+            <a:endParaRPr lang="cs-CZ" dirty="0" smtClean="0"/>
+          </a:p>
+          <a:p>
+            <a:pPr marL="514350" indent="-457200" fontAlgn="base"/>
+            <a:r>
+              <a:rPr lang="cs-CZ" dirty="0" smtClean="0"/>
+              <a:t>Pozor na </a:t>
+            </a:r>
+            <a:r>
+              <a:rPr lang="cs-CZ" dirty="0" err="1" smtClean="0"/>
+              <a:t>memory</a:t>
+            </a:r>
+            <a:r>
+              <a:rPr lang="cs-CZ" dirty="0" smtClean="0"/>
+              <a:t> </a:t>
+            </a:r>
+            <a:r>
+              <a:rPr lang="cs-CZ" dirty="0" err="1" smtClean="0"/>
+              <a:t>leaks</a:t>
+            </a:r>
+            <a:r>
+              <a:rPr lang="cs-CZ" dirty="0" smtClean="0"/>
+              <a:t> u </a:t>
+            </a:r>
+            <a:r>
+              <a:rPr lang="cs-CZ" dirty="0" err="1" smtClean="0"/>
+              <a:t>event</a:t>
+            </a:r>
+            <a:r>
+              <a:rPr lang="cs-CZ" dirty="0" smtClean="0"/>
+              <a:t> =&gt; </a:t>
+            </a:r>
+            <a:r>
+              <a:rPr lang="cs-CZ" dirty="0" err="1" smtClean="0"/>
+              <a:t>pouzit</a:t>
+            </a:r>
+            <a:r>
+              <a:rPr lang="cs-CZ" dirty="0" smtClean="0"/>
+              <a:t> </a:t>
+            </a:r>
+            <a:r>
+              <a:rPr lang="en-US" b="1" dirty="0" err="1" smtClean="0"/>
+              <a:t>WeakEventManager</a:t>
+            </a:r>
+            <a:endParaRPr lang="cs-CZ" dirty="0"/>
+          </a:p>
+          <a:p>
+            <a:pPr marL="514350" indent="-457200" fontAlgn="base"/>
+            <a:r>
+              <a:rPr lang="cs-CZ" dirty="0" err="1" smtClean="0"/>
+              <a:t>Predefinovane</a:t>
+            </a:r>
+            <a:r>
+              <a:rPr lang="cs-CZ" dirty="0" smtClean="0"/>
+              <a:t> </a:t>
+            </a:r>
+            <a:r>
+              <a:rPr lang="cs-CZ" dirty="0" err="1" smtClean="0"/>
+              <a:t>delegaty</a:t>
+            </a:r>
+            <a:r>
+              <a:rPr lang="cs-CZ" dirty="0" smtClean="0"/>
+              <a:t> </a:t>
+            </a:r>
+            <a:r>
+              <a:rPr lang="cs-CZ" dirty="0" err="1" smtClean="0"/>
+              <a:t>void</a:t>
+            </a:r>
+            <a:r>
+              <a:rPr lang="cs-CZ" dirty="0" smtClean="0"/>
+              <a:t> </a:t>
+            </a:r>
+            <a:r>
+              <a:rPr lang="cs-CZ" dirty="0" err="1" smtClean="0"/>
+              <a:t>Action</a:t>
+            </a:r>
+            <a:r>
+              <a:rPr lang="cs-CZ" dirty="0" smtClean="0"/>
+              <a:t>&lt;,,&gt; a </a:t>
+            </a:r>
+            <a:r>
+              <a:rPr lang="cs-CZ" dirty="0" err="1" smtClean="0"/>
+              <a:t>Func</a:t>
+            </a:r>
+            <a:r>
+              <a:rPr lang="cs-CZ" dirty="0" smtClean="0"/>
+              <a:t>&lt;,,&gt; kde poslední typ musí metoda vracet</a:t>
             </a:r>
             <a:endParaRPr lang="en-US" dirty="0"/>
           </a:p>
@@ -8576,7 +9083,7 @@
     </p:custDataLst>
     <p:extLst>
       <p:ext uri="{BB962C8B-B14F-4D97-AF65-F5344CB8AC3E}">
-        <p14:creationId xmlns:p14="http://schemas.microsoft.com/office/powerpoint/2010/main" val="1458288348"/>
+        <p14:creationId xmlns:p14="http://schemas.microsoft.com/office/powerpoint/2010/main" val="518512659"/>
       </p:ext>
     </p:extLst>
   </p:cSld>
@@ -8676,8 +9183,32 @@
             <a:pPr marL="514350" indent="-457200" fontAlgn="base"/>
             <a:r>
               <a:rPr lang="cs-CZ" dirty="0" smtClean="0"/>
-              <a:t>dopsat</a:t>
-            </a:r>
+              <a:t>Je rozhodně skvělá věc </a:t>
+            </a:r>
+            <a:r>
+              <a:rPr lang="cs-CZ" dirty="0" smtClean="0">
+                <a:sym typeface="Wingdings" pitchFamily="2" charset="2"/>
+              </a:rPr>
+              <a:t></a:t>
+            </a:r>
+          </a:p>
+          <a:p>
+            <a:pPr marL="514350" indent="-457200" fontAlgn="base"/>
+            <a:r>
+              <a:rPr lang="cs-CZ" dirty="0" smtClean="0">
+                <a:sym typeface="Wingdings" pitchFamily="2" charset="2"/>
+              </a:rPr>
+              <a:t>Přidává funkcionální </a:t>
+            </a:r>
+            <a:r>
+              <a:rPr lang="cs-CZ" smtClean="0">
+                <a:sym typeface="Wingdings" pitchFamily="2" charset="2"/>
+              </a:rPr>
+              <a:t>styl programování</a:t>
+            </a:r>
+          </a:p>
+          <a:p>
+            <a:pPr marL="514350" indent="-457200" fontAlgn="base"/>
             <a:endParaRPr lang="en-US" dirty="0"/>
           </a:p>
           <a:p>
@@ -8797,7 +9328,7 @@
           <a:p>
             <a:r>
               <a:rPr lang="cs-CZ" dirty="0" smtClean="0"/>
-              <a:t>Konvence</a:t>
+              <a:t>Typy </a:t>
             </a:r>
             <a:endParaRPr lang="en-US" dirty="0"/>
           </a:p>
@@ -8824,166 +9355,103 @@
           <a:lstStyle/>
           <a:p>
             <a:pPr fontAlgn="base"/>
-            <a:r>
-              <a:rPr lang="pt-BR" dirty="0"/>
-              <a:t>konvence </a:t>
-            </a:r>
-            <a:r>
-              <a:rPr lang="pt-BR" b="1" dirty="0"/>
-              <a:t>interface</a:t>
-            </a:r>
-            <a:r>
-              <a:rPr lang="pt-BR" dirty="0"/>
-              <a:t> začíná </a:t>
-            </a:r>
-            <a:r>
-              <a:rPr lang="pt-BR" b="1" dirty="0"/>
-              <a:t>I</a:t>
-            </a:r>
-            <a:r>
-              <a:rPr lang="pt-BR" dirty="0"/>
-              <a:t> viz </a:t>
-            </a:r>
-            <a:r>
-              <a:rPr lang="pt-BR" b="1" dirty="0"/>
-              <a:t>IList</a:t>
-            </a:r>
-            <a:r>
-              <a:rPr lang="pt-BR" dirty="0"/>
-              <a:t> a implementace </a:t>
-            </a:r>
-            <a:r>
-              <a:rPr lang="pt-BR" dirty="0" smtClean="0"/>
-              <a:t>List</a:t>
-            </a:r>
             <a:endParaRPr lang="cs-CZ" dirty="0" smtClean="0"/>
           </a:p>
           <a:p>
             <a:pPr fontAlgn="base"/>
-            <a:r>
-              <a:rPr lang="en-US" dirty="0" err="1"/>
-              <a:t>nazvy</a:t>
-            </a:r>
-            <a:r>
-              <a:rPr lang="en-US" dirty="0"/>
-              <a:t> </a:t>
-            </a:r>
-            <a:r>
-              <a:rPr lang="en-US" dirty="0" err="1"/>
-              <a:t>metod</a:t>
-            </a:r>
-            <a:r>
-              <a:rPr lang="en-US" dirty="0"/>
-              <a:t> </a:t>
-            </a:r>
-            <a:r>
-              <a:rPr lang="cs-CZ" dirty="0" smtClean="0"/>
-              <a:t>z </a:t>
-            </a:r>
-            <a:r>
-              <a:rPr lang="en-US" dirty="0" err="1" smtClean="0"/>
-              <a:t>pascal</a:t>
-            </a:r>
-            <a:r>
-              <a:rPr lang="cs-CZ" dirty="0" smtClean="0"/>
-              <a:t> konvence</a:t>
-            </a:r>
-            <a:r>
-              <a:rPr lang="en-US" dirty="0" smtClean="0"/>
-              <a:t> </a:t>
-            </a:r>
-            <a:r>
-              <a:rPr lang="en-US" dirty="0"/>
-              <a:t>(</a:t>
-            </a:r>
-            <a:r>
-              <a:rPr lang="en-US" dirty="0" err="1"/>
-              <a:t>hlavni</a:t>
-            </a:r>
-            <a:r>
-              <a:rPr lang="en-US" dirty="0"/>
-              <a:t> designer c# :-)) </a:t>
-            </a:r>
-            <a:r>
-              <a:rPr lang="en-US" dirty="0" err="1"/>
-              <a:t>první</a:t>
-            </a:r>
-            <a:r>
-              <a:rPr lang="en-US" dirty="0"/>
-              <a:t> </a:t>
-            </a:r>
-            <a:r>
-              <a:rPr lang="en-US" dirty="0" err="1"/>
-              <a:t>Velke</a:t>
-            </a:r>
-            <a:r>
-              <a:rPr lang="en-US" dirty="0"/>
-              <a:t> </a:t>
-            </a:r>
-            <a:r>
-              <a:rPr lang="en-US" dirty="0" err="1" smtClean="0"/>
-              <a:t>pismeno</a:t>
-            </a:r>
-            <a:r>
-              <a:rPr lang="cs-CZ" dirty="0" smtClean="0"/>
-              <a:t> </a:t>
-            </a:r>
-            <a:r>
-              <a:rPr lang="cs-CZ" dirty="0"/>
-              <a:t>viz </a:t>
-            </a:r>
-            <a:r>
-              <a:rPr lang="en-US" b="1" dirty="0" err="1"/>
-              <a:t>ToString</a:t>
-            </a:r>
-            <a:r>
-              <a:rPr lang="cs-CZ" b="1" dirty="0" smtClean="0"/>
-              <a:t>() </a:t>
-            </a:r>
-            <a:r>
-              <a:rPr lang="en-US" dirty="0" err="1" smtClean="0"/>
-              <a:t>jinak</a:t>
-            </a:r>
-            <a:r>
-              <a:rPr lang="en-US" dirty="0" smtClean="0"/>
-              <a:t> </a:t>
-            </a:r>
-            <a:r>
-              <a:rPr lang="en-US" dirty="0" err="1"/>
-              <a:t>stejny</a:t>
-            </a:r>
-            <a:r>
-              <a:rPr lang="en-US" dirty="0"/>
-              <a:t> </a:t>
-            </a:r>
-            <a:r>
-              <a:rPr lang="en-US" dirty="0" err="1"/>
-              <a:t>jako</a:t>
-            </a:r>
-            <a:r>
-              <a:rPr lang="en-US" dirty="0"/>
-              <a:t> u </a:t>
-            </a:r>
-            <a:r>
-              <a:rPr lang="en-US" dirty="0" err="1" smtClean="0"/>
-              <a:t>javy</a:t>
-            </a:r>
+            <a:endParaRPr lang="cs-CZ" dirty="0"/>
+          </a:p>
+          <a:p>
+            <a:pPr fontAlgn="base"/>
             <a:endParaRPr lang="cs-CZ" dirty="0" smtClean="0"/>
+          </a:p>
+          <a:p>
+            <a:pPr fontAlgn="base"/>
+            <a:endParaRPr lang="cs-CZ" dirty="0"/>
+          </a:p>
+          <a:p>
+            <a:pPr fontAlgn="base"/>
+            <a:endParaRPr lang="cs-CZ" dirty="0" smtClean="0"/>
+          </a:p>
+          <a:p>
+            <a:pPr fontAlgn="base"/>
+            <a:endParaRPr lang="cs-CZ" dirty="0"/>
+          </a:p>
+          <a:p>
+            <a:pPr fontAlgn="base"/>
+            <a:r>
+              <a:rPr lang="cs-CZ" dirty="0" smtClean="0">
+                <a:solidFill>
+                  <a:srgbClr val="C00000"/>
+                </a:solidFill>
+              </a:rPr>
+              <a:t>Pro typ peníze používat </a:t>
+            </a:r>
+            <a:r>
+              <a:rPr lang="cs-CZ" b="1" dirty="0" err="1" smtClean="0">
+                <a:solidFill>
+                  <a:srgbClr val="C00000"/>
+                </a:solidFill>
+              </a:rPr>
+              <a:t>decimal</a:t>
+            </a:r>
+            <a:endParaRPr lang="en-US" b="1" dirty="0">
+              <a:solidFill>
+                <a:srgbClr val="C00000"/>
+              </a:solidFill>
+            </a:endParaRPr>
+          </a:p>
+          <a:p>
+            <a:pPr fontAlgn="base"/>
+            <a:endParaRPr lang="pt-BR" dirty="0"/>
           </a:p>
           <a:p>
             <a:pPr fontAlgn="base"/>
             <a:endParaRPr lang="en-US" dirty="0"/>
           </a:p>
-          <a:p>
-            <a:pPr fontAlgn="base"/>
-            <a:endParaRPr lang="pt-BR" dirty="0"/>
-          </a:p>
-          <a:p>
-            <a:pPr fontAlgn="base"/>
-            <a:endParaRPr lang="en-US" dirty="0"/>
-          </a:p>
-        </p:txBody>
-      </p:sp>
+        </p:txBody>
+      </p:sp>
+      <p:pic>
+        <p:nvPicPr>
+          <p:cNvPr id="2050" name="Picture 2" descr="P:\Users\balat\Downloads\table5.3.gif"/>
+          <p:cNvPicPr>
+            <a:picLocks noChangeAspect="1" noChangeArrowheads="1"/>
+          </p:cNvPicPr>
+          <p:nvPr/>
+        </p:nvPicPr>
+        <p:blipFill>
+          <a:blip r:embed="rId6">
+            <a:extLst>
+              <a:ext uri="{28A0092B-C50C-407E-A947-70E740481C1C}">
+                <a14:useLocalDpi xmlns:a14="http://schemas.microsoft.com/office/drawing/2010/main" val="0"/>
+              </a:ext>
+            </a:extLst>
+          </a:blip>
+          <a:srcRect/>
+          <a:stretch>
+            <a:fillRect/>
+          </a:stretch>
+        </p:blipFill>
+        <p:spPr bwMode="auto">
+          <a:xfrm>
+            <a:off x="3419872" y="188640"/>
+            <a:ext cx="5600700" cy="4914900"/>
+          </a:xfrm>
+          <a:prstGeom prst="rect">
+            <a:avLst/>
+          </a:prstGeom>
+          <a:noFill/>
+          <a:extLst>
+            <a:ext uri="{909E8E84-426E-40DD-AFC4-6F175D3DCCD1}">
+              <a14:hiddenFill xmlns:a14="http://schemas.microsoft.com/office/drawing/2010/main">
+                <a:solidFill>
+                  <a:srgbClr val="FFFFFF"/>
+                </a:solidFill>
+              </a14:hiddenFill>
+            </a:ext>
+          </a:extLst>
+        </p:spPr>
+      </p:pic>
     </p:spTree>
     <p:custDataLst>
       <p:tags r:id="rId1"/>
@@ -9042,397 +9510,186 @@
         </p:nvSpPr>
         <p:spPr/>
         <p:txBody>
+          <a:bodyPr/>
+          <a:lstStyle/>
+          <a:p>
+            <a:r>
+              <a:rPr lang="cs-CZ" dirty="0" smtClean="0"/>
+              <a:t>Konvence</a:t>
+            </a:r>
+            <a:endParaRPr lang="en-US" dirty="0"/>
+          </a:p>
+        </p:txBody>
+      </p:sp>
+      <p:sp>
+        <p:nvSpPr>
+          <p:cNvPr id="5" name="Content Placeholder 4"/>
+          <p:cNvSpPr>
+            <a:spLocks noGrp="1"/>
+          </p:cNvSpPr>
+          <p:nvPr>
+            <p:ph idx="1"/>
+            <p:custDataLst>
+              <p:tags r:id="rId3"/>
+            </p:custDataLst>
+          </p:nvPr>
+        </p:nvSpPr>
+        <p:spPr/>
+        <p:txBody>
           <a:bodyPr>
             <a:normAutofit/>
           </a:bodyPr>
           <a:lstStyle/>
           <a:p>
-            <a:r>
-              <a:rPr lang="cs-CZ" dirty="0" err="1" smtClean="0"/>
-              <a:t>Object</a:t>
-            </a:r>
-            <a:r>
-              <a:rPr lang="cs-CZ" dirty="0" smtClean="0"/>
-              <a:t> a </a:t>
+            <a:pPr fontAlgn="base"/>
+            <a:r>
+              <a:rPr lang="pt-BR" dirty="0"/>
+              <a:t>konvence </a:t>
+            </a:r>
+            <a:r>
+              <a:rPr lang="pt-BR" b="1" dirty="0"/>
+              <a:t>interface</a:t>
+            </a:r>
+            <a:r>
+              <a:rPr lang="pt-BR" dirty="0"/>
+              <a:t> začíná </a:t>
+            </a:r>
+            <a:r>
+              <a:rPr lang="pt-BR" b="1" dirty="0"/>
+              <a:t>I</a:t>
+            </a:r>
+            <a:r>
+              <a:rPr lang="pt-BR" dirty="0"/>
+              <a:t> viz </a:t>
+            </a:r>
+            <a:r>
+              <a:rPr lang="pt-BR" b="1" dirty="0"/>
+              <a:t>IList</a:t>
+            </a:r>
+            <a:r>
+              <a:rPr lang="pt-BR" dirty="0"/>
+              <a:t> a implementace </a:t>
+            </a:r>
+            <a:r>
+              <a:rPr lang="pt-BR" dirty="0" smtClean="0"/>
+              <a:t>List</a:t>
+            </a:r>
+            <a:endParaRPr lang="cs-CZ" dirty="0" smtClean="0"/>
+          </a:p>
+          <a:p>
+            <a:pPr fontAlgn="base"/>
+            <a:r>
+              <a:rPr lang="en-US" dirty="0" err="1"/>
+              <a:t>nazvy</a:t>
+            </a:r>
+            <a:r>
+              <a:rPr lang="en-US" dirty="0"/>
+              <a:t> </a:t>
+            </a:r>
+            <a:r>
+              <a:rPr lang="en-US" dirty="0" err="1"/>
+              <a:t>metod</a:t>
+            </a:r>
+            <a:r>
+              <a:rPr lang="en-US" dirty="0"/>
+              <a:t> </a:t>
+            </a:r>
+            <a:r>
+              <a:rPr lang="cs-CZ" dirty="0" smtClean="0"/>
+              <a:t>z </a:t>
             </a:r>
             <a:r>
               <a:rPr lang="en-US" dirty="0" err="1" smtClean="0"/>
-              <a:t>ValueType</a:t>
-            </a:r>
-            <a:endParaRPr lang="en-US" dirty="0"/>
-          </a:p>
-        </p:txBody>
-      </p:sp>
-      <p:sp>
-        <p:nvSpPr>
-          <p:cNvPr id="5" name="Content Placeholder 4"/>
-          <p:cNvSpPr>
-            <a:spLocks noGrp="1"/>
-          </p:cNvSpPr>
-          <p:nvPr>
-            <p:ph idx="1"/>
-            <p:custDataLst>
-              <p:tags r:id="rId3"/>
-            </p:custDataLst>
-          </p:nvPr>
-        </p:nvSpPr>
-        <p:spPr/>
-        <p:txBody>
-          <a:bodyPr>
-            <a:normAutofit fontScale="92500" lnSpcReduction="20000"/>
-          </a:bodyPr>
-          <a:lstStyle/>
+              <a:t>pascal</a:t>
+            </a:r>
+            <a:r>
+              <a:rPr lang="cs-CZ" dirty="0" smtClean="0"/>
+              <a:t> konvence</a:t>
+            </a:r>
+            <a:r>
+              <a:rPr lang="en-US" dirty="0" smtClean="0"/>
+              <a:t> </a:t>
+            </a:r>
+            <a:r>
+              <a:rPr lang="en-US" dirty="0"/>
+              <a:t>(</a:t>
+            </a:r>
+            <a:r>
+              <a:rPr lang="en-US" dirty="0" err="1"/>
+              <a:t>hlavni</a:t>
+            </a:r>
+            <a:r>
+              <a:rPr lang="en-US" dirty="0"/>
+              <a:t> designer c# :-)) </a:t>
+            </a:r>
+            <a:r>
+              <a:rPr lang="en-US" dirty="0" err="1"/>
+              <a:t>první</a:t>
+            </a:r>
+            <a:r>
+              <a:rPr lang="en-US" dirty="0"/>
+              <a:t> </a:t>
+            </a:r>
+            <a:r>
+              <a:rPr lang="en-US" dirty="0" err="1"/>
+              <a:t>Velke</a:t>
+            </a:r>
+            <a:r>
+              <a:rPr lang="en-US" dirty="0"/>
+              <a:t> </a:t>
+            </a:r>
+            <a:r>
+              <a:rPr lang="en-US" dirty="0" err="1" smtClean="0"/>
+              <a:t>pismeno</a:t>
+            </a:r>
+            <a:r>
+              <a:rPr lang="cs-CZ" dirty="0" smtClean="0"/>
+              <a:t> </a:t>
+            </a:r>
+            <a:r>
+              <a:rPr lang="cs-CZ" dirty="0"/>
+              <a:t>viz </a:t>
+            </a:r>
+            <a:r>
+              <a:rPr lang="en-US" b="1" dirty="0" err="1"/>
+              <a:t>ToString</a:t>
+            </a:r>
+            <a:r>
+              <a:rPr lang="cs-CZ" b="1" dirty="0" smtClean="0"/>
+              <a:t>() </a:t>
+            </a:r>
+            <a:r>
+              <a:rPr lang="en-US" dirty="0" err="1" smtClean="0"/>
+              <a:t>jinak</a:t>
+            </a:r>
+            <a:r>
+              <a:rPr lang="en-US" dirty="0" smtClean="0"/>
+              <a:t> </a:t>
+            </a:r>
+            <a:r>
+              <a:rPr lang="en-US" dirty="0" err="1"/>
+              <a:t>stejny</a:t>
+            </a:r>
+            <a:r>
+              <a:rPr lang="en-US" dirty="0"/>
+              <a:t> </a:t>
+            </a:r>
+            <a:r>
+              <a:rPr lang="en-US" dirty="0" err="1"/>
+              <a:t>jako</a:t>
+            </a:r>
+            <a:r>
+              <a:rPr lang="en-US" dirty="0"/>
+              <a:t> u </a:t>
+            </a:r>
+            <a:r>
+              <a:rPr lang="en-US" dirty="0" err="1" smtClean="0"/>
+              <a:t>javy</a:t>
+            </a:r>
+            <a:endParaRPr lang="cs-CZ" dirty="0" smtClean="0"/>
+          </a:p>
           <a:p>
             <a:pPr fontAlgn="base"/>
-            <a:r>
-              <a:rPr lang="cs-CZ" dirty="0" err="1" smtClean="0"/>
-              <a:t>Class</a:t>
-            </a:r>
-            <a:r>
-              <a:rPr lang="cs-CZ" dirty="0" smtClean="0"/>
-              <a:t> dědí po </a:t>
-            </a:r>
-            <a:r>
-              <a:rPr lang="cs-CZ" dirty="0" err="1" smtClean="0"/>
-              <a:t>Object</a:t>
-            </a:r>
-            <a:endParaRPr lang="cs-CZ" dirty="0"/>
-          </a:p>
-          <a:p>
-            <a:pPr fontAlgn="base"/>
-            <a:r>
-              <a:rPr lang="cs-CZ" dirty="0" err="1" smtClean="0"/>
-              <a:t>Struct</a:t>
-            </a:r>
-            <a:r>
-              <a:rPr lang="cs-CZ" dirty="0" smtClean="0"/>
-              <a:t> dědí po </a:t>
-            </a:r>
-            <a:r>
-              <a:rPr lang="en-US" dirty="0" err="1" smtClean="0"/>
-              <a:t>ValueType</a:t>
-            </a:r>
-            <a:r>
-              <a:rPr lang="cs-CZ" dirty="0" smtClean="0"/>
-              <a:t> (neexistuje metoda </a:t>
-            </a:r>
-            <a:r>
-              <a:rPr lang="en-US" dirty="0" err="1" smtClean="0"/>
-              <a:t>GetType</a:t>
-            </a:r>
-            <a:r>
-              <a:rPr lang="cs-CZ" dirty="0" smtClean="0"/>
-              <a:t>(), destruktor a static metody </a:t>
-            </a:r>
-            <a:r>
-              <a:rPr lang="en-US" dirty="0" smtClean="0"/>
-              <a:t>Equals</a:t>
-            </a:r>
-            <a:endParaRPr lang="en-US" dirty="0"/>
-          </a:p>
-          <a:p>
-            <a:pPr fontAlgn="base"/>
-            <a:r>
-              <a:rPr lang="cs-CZ" dirty="0" smtClean="0"/>
-              <a:t>)</a:t>
-            </a:r>
-          </a:p>
-          <a:p>
-            <a:pPr fontAlgn="base"/>
-            <a:r>
-              <a:rPr lang="cs-CZ" b="1" dirty="0" err="1"/>
-              <a:t>string</a:t>
-            </a:r>
-            <a:r>
-              <a:rPr lang="cs-CZ" dirty="0"/>
-              <a:t> je alias k </a:t>
-            </a:r>
-            <a:r>
-              <a:rPr lang="cs-CZ" b="1" dirty="0" err="1"/>
-              <a:t>System.String</a:t>
-            </a:r>
-            <a:r>
-              <a:rPr lang="cs-CZ" b="1" dirty="0"/>
-              <a:t> </a:t>
-            </a:r>
-            <a:r>
-              <a:rPr lang="cs-CZ" dirty="0"/>
-              <a:t>je vždy </a:t>
-            </a:r>
-            <a:r>
-              <a:rPr lang="cs-CZ" dirty="0" err="1"/>
-              <a:t>immutable</a:t>
-            </a:r>
-            <a:r>
-              <a:rPr lang="cs-CZ" dirty="0"/>
-              <a:t> tzn. </a:t>
-            </a:r>
-            <a:r>
-              <a:rPr lang="cs-CZ" dirty="0" err="1"/>
-              <a:t>muze</a:t>
-            </a:r>
-            <a:r>
-              <a:rPr lang="cs-CZ" dirty="0"/>
-              <a:t> se </a:t>
-            </a:r>
-            <a:r>
-              <a:rPr lang="cs-CZ" dirty="0" err="1"/>
-              <a:t>pouzivat</a:t>
-            </a:r>
-            <a:r>
-              <a:rPr lang="cs-CZ" dirty="0"/>
-              <a:t> ==</a:t>
-            </a:r>
-            <a:endParaRPr lang="cs-CZ" b="1" dirty="0"/>
-          </a:p>
-          <a:p>
-            <a:pPr fontAlgn="base"/>
-            <a:r>
-              <a:rPr lang="cs-CZ" b="1" dirty="0" err="1"/>
-              <a:t>ToString</a:t>
-            </a:r>
-            <a:r>
-              <a:rPr lang="cs-CZ" dirty="0"/>
-              <a:t>() </a:t>
-            </a:r>
-            <a:r>
-              <a:rPr lang="cs-CZ" b="1" dirty="0" smtClean="0">
-                <a:solidFill>
-                  <a:srgbClr val="FF0000"/>
-                </a:solidFill>
-              </a:rPr>
-              <a:t>pozor double </a:t>
-            </a:r>
-            <a:r>
-              <a:rPr lang="cs-CZ" b="1" dirty="0" err="1" smtClean="0">
-                <a:solidFill>
-                  <a:srgbClr val="FF0000"/>
-                </a:solidFill>
-              </a:rPr>
-              <a:t>apod</a:t>
-            </a:r>
-            <a:r>
-              <a:rPr lang="cs-CZ" b="1" dirty="0" smtClean="0">
-                <a:solidFill>
-                  <a:srgbClr val="FF0000"/>
-                </a:solidFill>
-              </a:rPr>
-              <a:t> </a:t>
-            </a:r>
-            <a:r>
-              <a:rPr lang="en-US" b="1" dirty="0" err="1" smtClean="0">
-                <a:solidFill>
-                  <a:srgbClr val="FF0000"/>
-                </a:solidFill>
-              </a:rPr>
-              <a:t>závislý</a:t>
-            </a:r>
-            <a:r>
-              <a:rPr lang="en-US" b="1" dirty="0" smtClean="0">
-                <a:solidFill>
-                  <a:srgbClr val="FF0000"/>
-                </a:solidFill>
-              </a:rPr>
-              <a:t> </a:t>
-            </a:r>
-            <a:r>
-              <a:rPr lang="en-US" b="1" dirty="0" err="1">
-                <a:solidFill>
-                  <a:srgbClr val="FF0000"/>
-                </a:solidFill>
-              </a:rPr>
-              <a:t>na</a:t>
-            </a:r>
-            <a:r>
-              <a:rPr lang="en-US" b="1" dirty="0">
-                <a:solidFill>
-                  <a:srgbClr val="FF0000"/>
-                </a:solidFill>
-              </a:rPr>
-              <a:t> local </a:t>
-            </a:r>
-            <a:r>
-              <a:rPr lang="en-US" b="1" dirty="0" err="1">
-                <a:solidFill>
-                  <a:srgbClr val="FF0000"/>
-                </a:solidFill>
-              </a:rPr>
-              <a:t>nastavení</a:t>
-            </a:r>
-            <a:r>
-              <a:rPr lang="en-US" b="1" dirty="0">
-                <a:solidFill>
-                  <a:srgbClr val="FF0000"/>
-                </a:solidFill>
-              </a:rPr>
-              <a:t> </a:t>
-            </a:r>
-            <a:r>
-              <a:rPr lang="en-US" b="1" dirty="0" err="1">
-                <a:solidFill>
-                  <a:srgbClr val="FF0000"/>
-                </a:solidFill>
-              </a:rPr>
-              <a:t>počítače</a:t>
-            </a:r>
-            <a:r>
-              <a:rPr lang="en-US" b="1" dirty="0">
-                <a:solidFill>
-                  <a:srgbClr val="FF0000"/>
-                </a:solidFill>
-              </a:rPr>
-              <a:t> -&gt; </a:t>
-            </a:r>
-            <a:r>
-              <a:rPr lang="en-US" b="1" dirty="0" err="1">
-                <a:solidFill>
-                  <a:srgbClr val="FF0000"/>
-                </a:solidFill>
-              </a:rPr>
-              <a:t>doporucuju</a:t>
-            </a:r>
-            <a:r>
-              <a:rPr lang="en-US" b="1" dirty="0">
-                <a:solidFill>
-                  <a:srgbClr val="FF0000"/>
-                </a:solidFill>
-              </a:rPr>
-              <a:t> </a:t>
-            </a:r>
-            <a:r>
-              <a:rPr lang="en-US" b="1" dirty="0" err="1">
-                <a:solidFill>
-                  <a:srgbClr val="FF0000"/>
-                </a:solidFill>
-              </a:rPr>
-              <a:t>si</a:t>
-            </a:r>
-            <a:r>
-              <a:rPr lang="en-US" b="1" dirty="0">
-                <a:solidFill>
-                  <a:srgbClr val="FF0000"/>
-                </a:solidFill>
-              </a:rPr>
-              <a:t> </a:t>
-            </a:r>
-            <a:r>
-              <a:rPr lang="en-US" b="1" dirty="0" err="1">
-                <a:solidFill>
-                  <a:srgbClr val="FF0000"/>
-                </a:solidFill>
-              </a:rPr>
-              <a:t>napsat</a:t>
-            </a:r>
-            <a:r>
-              <a:rPr lang="en-US" b="1" dirty="0">
-                <a:solidFill>
-                  <a:srgbClr val="FF0000"/>
-                </a:solidFill>
-              </a:rPr>
-              <a:t> extension static </a:t>
-            </a:r>
-            <a:r>
-              <a:rPr lang="en-US" b="1" dirty="0" err="1">
-                <a:solidFill>
-                  <a:srgbClr val="FF0000"/>
-                </a:solidFill>
-              </a:rPr>
-              <a:t>metody</a:t>
-            </a:r>
-            <a:r>
-              <a:rPr lang="en-US" b="1" dirty="0">
-                <a:solidFill>
-                  <a:srgbClr val="FF0000"/>
-                </a:solidFill>
-              </a:rPr>
-              <a:t> </a:t>
-            </a:r>
-            <a:r>
-              <a:rPr lang="en-US" b="1" dirty="0" err="1">
-                <a:solidFill>
-                  <a:srgbClr val="FF0000"/>
-                </a:solidFill>
-              </a:rPr>
-              <a:t>MoneyToString</a:t>
-            </a:r>
-            <a:r>
-              <a:rPr lang="en-US" b="1" dirty="0">
-                <a:solidFill>
-                  <a:srgbClr val="FF0000"/>
-                </a:solidFill>
-              </a:rPr>
-              <a:t>() </a:t>
-            </a:r>
-            <a:r>
-              <a:rPr lang="en-US" b="1" dirty="0" err="1">
-                <a:solidFill>
-                  <a:srgbClr val="FF0000"/>
-                </a:solidFill>
-              </a:rPr>
-              <a:t>apod</a:t>
-            </a:r>
-            <a:r>
-              <a:rPr lang="en-US" b="1" dirty="0">
-                <a:solidFill>
-                  <a:srgbClr val="FF0000"/>
-                </a:solidFill>
-              </a:rPr>
-              <a:t>. </a:t>
-            </a:r>
-            <a:r>
-              <a:rPr lang="en-US" b="1" dirty="0" err="1">
-                <a:solidFill>
-                  <a:srgbClr val="FF0000"/>
-                </a:solidFill>
-              </a:rPr>
-              <a:t>viz</a:t>
-            </a:r>
-            <a:r>
-              <a:rPr lang="en-US" b="1" dirty="0">
-                <a:solidFill>
-                  <a:srgbClr val="FF0000"/>
-                </a:solidFill>
-              </a:rPr>
-              <a:t> </a:t>
-            </a:r>
-            <a:r>
-              <a:rPr lang="en-US" b="1" dirty="0" err="1">
-                <a:solidFill>
-                  <a:srgbClr val="FF0000"/>
-                </a:solidFill>
-              </a:rPr>
-              <a:t>priklad</a:t>
-            </a:r>
-            <a:r>
-              <a:rPr lang="en-US" b="1" dirty="0">
-                <a:solidFill>
-                  <a:srgbClr val="FF0000"/>
-                </a:solidFill>
-              </a:rPr>
-              <a:t> </a:t>
-            </a:r>
-            <a:r>
-              <a:rPr lang="en-US" b="1" dirty="0" err="1">
-                <a:solidFill>
-                  <a:srgbClr val="FF0000"/>
-                </a:solidFill>
-              </a:rPr>
-              <a:t>TestToStringCulture.cs</a:t>
-            </a:r>
-            <a:endParaRPr lang="cs-CZ" b="1" dirty="0">
-              <a:solidFill>
-                <a:srgbClr val="FF0000"/>
-              </a:solidFill>
-            </a:endParaRPr>
-          </a:p>
-          <a:p>
-            <a:pPr fontAlgn="base"/>
-            <a:endParaRPr lang="en-US" dirty="0"/>
-          </a:p>
-          <a:p>
-            <a:pPr marL="0" indent="0" fontAlgn="base">
-              <a:buNone/>
-            </a:pPr>
             <a:endParaRPr lang="en-US" dirty="0"/>
           </a:p>
           <a:p>
@@ -9451,7 +9708,7 @@
     </p:custDataLst>
     <p:extLst>
       <p:ext uri="{BB962C8B-B14F-4D97-AF65-F5344CB8AC3E}">
-        <p14:creationId xmlns:p14="http://schemas.microsoft.com/office/powerpoint/2010/main" val="375692060"/>
+        <p14:creationId xmlns:p14="http://schemas.microsoft.com/office/powerpoint/2010/main" val="4047036011"/>
       </p:ext>
     </p:extLst>
   </p:cSld>
@@ -9503,12 +9760,22 @@
         </p:nvSpPr>
         <p:spPr/>
         <p:txBody>
-          <a:bodyPr/>
+          <a:bodyPr>
+            <a:normAutofit/>
+          </a:bodyPr>
           <a:lstStyle/>
           <a:p>
             <a:r>
-              <a:rPr lang="cs-CZ" dirty="0" smtClean="0"/>
-              <a:t>Kolekce</a:t>
+              <a:rPr lang="cs-CZ" dirty="0" err="1" smtClean="0"/>
+              <a:t>Object</a:t>
+            </a:r>
+            <a:r>
+              <a:rPr lang="cs-CZ" dirty="0" smtClean="0"/>
+              <a:t> a </a:t>
+            </a:r>
+            <a:r>
+              <a:rPr lang="en-US" dirty="0" err="1" smtClean="0"/>
+              <a:t>ValueType</a:t>
             </a:r>
             <a:endParaRPr lang="en-US" dirty="0"/>
           </a:p>
@@ -9530,175 +9797,383 @@
         <p:spPr/>
         <p:txBody>
           <a:bodyPr>
-            <a:normAutofit lnSpcReduction="10000"/>
+            <a:normAutofit fontScale="85000" lnSpcReduction="20000"/>
           </a:bodyPr>
           <a:lstStyle/>
           <a:p>
             <a:pPr fontAlgn="base"/>
             <a:r>
-              <a:rPr lang="cs-CZ" dirty="0" smtClean="0"/>
-              <a:t>K</a:t>
+              <a:rPr lang="cs-CZ" dirty="0" err="1" smtClean="0"/>
+              <a:t>Class</a:t>
+            </a:r>
+            <a:r>
+              <a:rPr lang="cs-CZ" dirty="0" smtClean="0"/>
+              <a:t> dědí po </a:t>
+            </a:r>
+            <a:r>
+              <a:rPr lang="cs-CZ" dirty="0" err="1" smtClean="0"/>
+              <a:t>Object</a:t>
+            </a:r>
+            <a:endParaRPr lang="cs-CZ" dirty="0"/>
+          </a:p>
+          <a:p>
+            <a:pPr fontAlgn="base"/>
+            <a:r>
+              <a:rPr lang="cs-CZ" dirty="0" err="1" smtClean="0"/>
+              <a:t>Struct</a:t>
+            </a:r>
+            <a:r>
+              <a:rPr lang="cs-CZ" dirty="0" smtClean="0"/>
+              <a:t> dědí po </a:t>
             </a:r>
             <a:r>
               <a:rPr lang="en-US" dirty="0" err="1" smtClean="0"/>
-              <a:t>olekce</a:t>
+              <a:t>ValueType</a:t>
+            </a:r>
+            <a:r>
+              <a:rPr lang="cs-CZ" dirty="0" smtClean="0"/>
+              <a:t> (neexistuje metoda </a:t>
+            </a:r>
+            <a:r>
+              <a:rPr lang="en-US" dirty="0" err="1" smtClean="0"/>
+              <a:t>GetType</a:t>
+            </a:r>
+            <a:r>
+              <a:rPr lang="cs-CZ" dirty="0" smtClean="0"/>
+              <a:t>(), destruktor a static metody </a:t>
             </a:r>
             <a:r>
               <a:rPr lang="en-US" dirty="0" smtClean="0"/>
-              <a:t> z</a:t>
-            </a:r>
-            <a:r>
-              <a:rPr lang="cs-CZ" dirty="0" smtClean="0"/>
-              <a:t>e</a:t>
-            </a:r>
-            <a:r>
-              <a:rPr lang="en-US" dirty="0" smtClean="0"/>
+              <a:t>Equals</a:t>
+            </a:r>
+            <a:endParaRPr lang="en-US" dirty="0"/>
+          </a:p>
+          <a:p>
+            <a:pPr fontAlgn="base"/>
+            <a:r>
+              <a:rPr lang="cs-CZ" dirty="0" smtClean="0"/>
+              <a:t>)</a:t>
+            </a:r>
+          </a:p>
+          <a:p>
+            <a:pPr fontAlgn="base"/>
+            <a:r>
+              <a:rPr lang="cs-CZ" b="1" dirty="0" err="1"/>
+              <a:t>string</a:t>
+            </a:r>
+            <a:r>
+              <a:rPr lang="cs-CZ" dirty="0"/>
+              <a:t> je alias k </a:t>
+            </a:r>
+            <a:r>
+              <a:rPr lang="cs-CZ" b="1" dirty="0" err="1"/>
+              <a:t>System.String</a:t>
+            </a:r>
+            <a:r>
+              <a:rPr lang="cs-CZ" b="1" dirty="0"/>
               <a:t> </a:t>
             </a:r>
             <a:r>
-              <a:rPr lang="en-US" dirty="0" err="1"/>
-              <a:t>dvou</a:t>
-            </a:r>
-            <a:r>
-              <a:rPr lang="en-US" dirty="0"/>
-              <a:t> namespace </a:t>
-            </a:r>
-            <a:r>
-              <a:rPr lang="en-US" b="1" dirty="0" err="1"/>
-              <a:t>System.Collections</a:t>
-            </a:r>
-            <a:r>
-              <a:rPr lang="en-US" dirty="0"/>
-              <a:t> a </a:t>
-            </a:r>
-            <a:r>
-              <a:rPr lang="en-US" b="1" dirty="0" err="1"/>
-              <a:t>System.Collections.Generic</a:t>
-            </a:r>
-            <a:r>
-              <a:rPr lang="en-US" dirty="0"/>
+              <a:rPr lang="cs-CZ" dirty="0"/>
+              <a:t>je vždy </a:t>
+            </a:r>
+            <a:r>
+              <a:rPr lang="cs-CZ" dirty="0" err="1"/>
+              <a:t>immutable</a:t>
+            </a:r>
+            <a:r>
+              <a:rPr lang="cs-CZ" dirty="0"/>
+              <a:t> tzn. </a:t>
+            </a:r>
+            <a:r>
+              <a:rPr lang="cs-CZ" dirty="0" err="1"/>
+              <a:t>muze</a:t>
+            </a:r>
+            <a:r>
+              <a:rPr lang="cs-CZ" dirty="0"/>
+              <a:t> se </a:t>
+            </a:r>
+            <a:r>
+              <a:rPr lang="cs-CZ" dirty="0" err="1"/>
+              <a:t>pouzivat</a:t>
+            </a:r>
+            <a:r>
+              <a:rPr lang="cs-CZ" dirty="0"/>
               <a:t> </a:t>
             </a:r>
-            <a:endParaRPr lang="cs-CZ" dirty="0" smtClean="0"/>
+            <a:r>
+              <a:rPr lang="cs-CZ" dirty="0" smtClean="0"/>
+              <a:t>==</a:t>
+            </a:r>
           </a:p>
           <a:p>
             <a:pPr fontAlgn="base"/>
             <a:r>
-              <a:rPr lang="en-US" dirty="0" err="1" smtClean="0"/>
-              <a:t>pouzivat</a:t>
-            </a:r>
-            <a:r>
-              <a:rPr lang="en-US" dirty="0" smtClean="0"/>
+              <a:rPr lang="cs-CZ" b="1" dirty="0" smtClean="0"/>
+              <a:t>@ </a:t>
+            </a:r>
+            <a:r>
+              <a:rPr lang="cs-CZ" dirty="0" err="1" smtClean="0"/>
+              <a:t>verbatim</a:t>
+            </a:r>
+            <a:r>
+              <a:rPr lang="cs-CZ" dirty="0" smtClean="0"/>
               <a:t> </a:t>
             </a:r>
             <a:r>
-              <a:rPr lang="en-US" dirty="0" err="1"/>
-              <a:t>misto</a:t>
-            </a:r>
-            <a:r>
-              <a:rPr lang="en-US" dirty="0"/>
+              <a:rPr lang="cs-CZ" dirty="0" err="1" smtClean="0"/>
+              <a:t>string</a:t>
+            </a:r>
+            <a:endParaRPr lang="cs-CZ" dirty="0"/>
+          </a:p>
+          <a:p>
+            <a:pPr fontAlgn="base"/>
+            <a:r>
+              <a:rPr lang="cs-CZ" b="1" dirty="0" err="1"/>
+              <a:t>ToString</a:t>
+            </a:r>
+            <a:r>
+              <a:rPr lang="cs-CZ" dirty="0"/>
+              <a:t>() </a:t>
+            </a:r>
+            <a:r>
+              <a:rPr lang="cs-CZ" b="1" dirty="0" smtClean="0">
+                <a:solidFill>
+                  <a:srgbClr val="FF0000"/>
+                </a:solidFill>
+              </a:rPr>
+              <a:t>pozor double </a:t>
+            </a:r>
+            <a:r>
+              <a:rPr lang="cs-CZ" b="1" dirty="0" err="1" smtClean="0">
+                <a:solidFill>
+                  <a:srgbClr val="FF0000"/>
+                </a:solidFill>
+              </a:rPr>
+              <a:t>apod</a:t>
+            </a:r>
+            <a:r>
+              <a:rPr lang="cs-CZ" b="1" dirty="0" smtClean="0">
+                <a:solidFill>
+                  <a:srgbClr val="FF0000"/>
+                </a:solidFill>
+              </a:rPr>
               <a:t> </a:t>
             </a:r>
             <a:r>
-              <a:rPr lang="en-US" dirty="0" err="1"/>
-              <a:t>ICollection</a:t>
-            </a:r>
-            <a:r>
-              <a:rPr lang="en-US" dirty="0"/>
+              <a:rPr lang="en-US" b="1" dirty="0" err="1" smtClean="0">
+                <a:solidFill>
+                  <a:srgbClr val="FF0000"/>
+                </a:solidFill>
+              </a:rPr>
+              <a:t>závislý</a:t>
+            </a:r>
+            <a:r>
+              <a:rPr lang="en-US" b="1" dirty="0" smtClean="0">
+                <a:solidFill>
+                  <a:srgbClr val="FF0000"/>
+                </a:solidFill>
+              </a:rPr>
               <a:t> </a:t>
             </a:r>
             <a:r>
-              <a:rPr lang="en-US" dirty="0" err="1"/>
-              <a:t>nebo</a:t>
-            </a:r>
-            <a:r>
-              <a:rPr lang="en-US" dirty="0"/>
+              <a:rPr lang="en-US" b="1" dirty="0" err="1">
+                <a:solidFill>
+                  <a:srgbClr val="FF0000"/>
+                </a:solidFill>
+              </a:rPr>
+              <a:t>na</a:t>
+            </a:r>
+            <a:r>
+              <a:rPr lang="en-US" b="1" dirty="0">
+                <a:solidFill>
+                  <a:srgbClr val="FF0000"/>
+                </a:solidFill>
+              </a:rPr>
+              <a:t> local </a:t>
+            </a:r>
+            <a:r>
+              <a:rPr lang="en-US" b="1" dirty="0" err="1">
+                <a:solidFill>
+                  <a:srgbClr val="FF0000"/>
+                </a:solidFill>
+              </a:rPr>
+              <a:t>nastavení</a:t>
+            </a:r>
+            <a:r>
+              <a:rPr lang="en-US" b="1" dirty="0">
+                <a:solidFill>
+                  <a:srgbClr val="FF0000"/>
+                </a:solidFill>
+              </a:rPr>
               <a:t> </a:t>
             </a:r>
             <a:r>
-              <a:rPr lang="en-US" dirty="0" err="1"/>
-              <a:t>IList</a:t>
-            </a:r>
-            <a:r>
-              <a:rPr lang="en-US" dirty="0"/>
+              <a:rPr lang="en-US" b="1" dirty="0" err="1">
+                <a:solidFill>
+                  <a:srgbClr val="FF0000"/>
+                </a:solidFill>
+              </a:rPr>
+              <a:t>počítače</a:t>
+            </a:r>
+            <a:r>
+              <a:rPr lang="en-US" b="1" dirty="0">
+                <a:solidFill>
+                  <a:srgbClr val="FF0000"/>
+                </a:solidFill>
+              </a:rPr>
+              <a:t> -&gt; </a:t>
+            </a:r>
+            <a:r>
+              <a:rPr lang="en-US" b="1" dirty="0" err="1">
+                <a:solidFill>
+                  <a:srgbClr val="FF0000"/>
+                </a:solidFill>
+              </a:rPr>
+              <a:t>doporucuju</a:t>
+            </a:r>
+            <a:r>
+              <a:rPr lang="en-US" b="1" dirty="0">
+                <a:solidFill>
+                  <a:srgbClr val="FF0000"/>
+                </a:solidFill>
+              </a:rPr>
               <a:t> </a:t>
             </a:r>
             <a:r>
-              <a:rPr lang="cs-CZ" b="1" dirty="0" smtClean="0"/>
-              <a:t>IE</a:t>
-            </a:r>
-            <a:r>
-              <a:rPr lang="en-US" b="1" dirty="0" smtClean="0"/>
-              <a:t>numerable</a:t>
-            </a:r>
-            <a:r>
-              <a:rPr lang="cs-CZ" b="1" dirty="0" smtClean="0"/>
-              <a:t>&lt;&gt;</a:t>
-            </a:r>
+              <a:rPr lang="en-US" b="1" dirty="0" err="1">
+                <a:solidFill>
+                  <a:srgbClr val="FF0000"/>
+                </a:solidFill>
+              </a:rPr>
+              <a:t>si</a:t>
+            </a:r>
+            <a:r>
+              <a:rPr lang="en-US" b="1" dirty="0">
+                <a:solidFill>
+                  <a:srgbClr val="FF0000"/>
+                </a:solidFill>
+              </a:rPr>
+              <a:t> </a:t>
+            </a:r>
+            <a:r>
+              <a:rPr lang="en-US" b="1" dirty="0" err="1">
+                <a:solidFill>
+                  <a:srgbClr val="FF0000"/>
+                </a:solidFill>
+              </a:rPr>
+              <a:t>napsat</a:t>
+            </a:r>
+            <a:r>
+              <a:rPr lang="en-US" b="1" dirty="0">
+                <a:solidFill>
+                  <a:srgbClr val="FF0000"/>
+                </a:solidFill>
+              </a:rPr>
+              <a:t> extension static </a:t>
+            </a:r>
+            <a:r>
+              <a:rPr lang="en-US" b="1" dirty="0" err="1">
+                <a:solidFill>
+                  <a:srgbClr val="FF0000"/>
+                </a:solidFill>
+              </a:rPr>
+              <a:t>metody</a:t>
+            </a:r>
+            <a:r>
+              <a:rPr lang="en-US" b="1" dirty="0">
+                <a:solidFill>
+                  <a:srgbClr val="FF0000"/>
+                </a:solidFill>
+              </a:rPr>
+              <a:t> </a:t>
+            </a:r>
+            <a:r>
+              <a:rPr lang="en-US" b="1" dirty="0" err="1">
+                <a:solidFill>
+                  <a:srgbClr val="FF0000"/>
+                </a:solidFill>
+              </a:rPr>
+              <a:t>MoneyToString</a:t>
+            </a:r>
+            <a:r>
+              <a:rPr lang="en-US" b="1" dirty="0">
+                <a:solidFill>
+                  <a:srgbClr val="FF0000"/>
+                </a:solidFill>
+              </a:rPr>
+              <a:t>() </a:t>
+            </a:r>
+            <a:r>
+              <a:rPr lang="en-US" b="1" dirty="0" err="1">
+                <a:solidFill>
+                  <a:srgbClr val="FF0000"/>
+                </a:solidFill>
+              </a:rPr>
+              <a:t>apod</a:t>
+            </a:r>
+            <a:r>
+              <a:rPr lang="en-US" b="1" dirty="0">
+                <a:solidFill>
+                  <a:srgbClr val="FF0000"/>
+                </a:solidFill>
+              </a:rPr>
+              <a:t>. </a:t>
+            </a:r>
+            <a:r>
+              <a:rPr lang="en-US" b="1" dirty="0" err="1">
+                <a:solidFill>
+                  <a:srgbClr val="FF0000"/>
+                </a:solidFill>
+              </a:rPr>
+              <a:t>viz</a:t>
+            </a:r>
+            <a:r>
+              <a:rPr lang="en-US" b="1" dirty="0">
+                <a:solidFill>
+                  <a:srgbClr val="FF0000"/>
+                </a:solidFill>
+              </a:rPr>
+              <a:t> </a:t>
+            </a:r>
+            <a:r>
+              <a:rPr lang="en-US" b="1" dirty="0" err="1">
+                <a:solidFill>
+                  <a:srgbClr val="FF0000"/>
+                </a:solidFill>
+              </a:rPr>
+              <a:t>priklad</a:t>
+            </a:r>
+            <a:r>
+              <a:rPr lang="en-US" b="1" dirty="0">
+                <a:solidFill>
+                  <a:srgbClr val="FF0000"/>
+                </a:solidFill>
+              </a:rPr>
+              <a:t> </a:t>
+            </a:r>
+            <a:r>
+              <a:rPr lang="en-US" b="1" dirty="0" err="1">
+                <a:solidFill>
+                  <a:srgbClr val="FF0000"/>
+                </a:solidFill>
+              </a:rPr>
+              <a:t>TestToStringCulture.cs</a:t>
+            </a:r>
+            <a:endParaRPr lang="cs-CZ" b="1" dirty="0">
+              <a:solidFill>
+                <a:srgbClr val="FF0000"/>
+              </a:solidFill>
+            </a:endParaRPr>
           </a:p>
           <a:p>
             <a:pPr fontAlgn="base"/>
-            <a:r>
-              <a:rPr lang="cs-CZ" dirty="0" smtClean="0"/>
-              <a:t>Místo mapy je </a:t>
-            </a:r>
-            <a:r>
-              <a:rPr lang="cs-CZ" dirty="0" err="1" smtClean="0"/>
-              <a:t>IDictionary</a:t>
-            </a:r>
-            <a:r>
-              <a:rPr lang="cs-CZ" dirty="0" smtClean="0"/>
-              <a:t>&lt;,&gt;</a:t>
-            </a:r>
-          </a:p>
-          <a:p>
-            <a:pPr fontAlgn="base"/>
-            <a:r>
-              <a:rPr lang="cs-CZ" dirty="0" smtClean="0"/>
-              <a:t>Do kolekce lze </a:t>
-            </a:r>
-            <a:r>
-              <a:rPr lang="cs-CZ" dirty="0" err="1" smtClean="0"/>
-              <a:t>vkladat</a:t>
-            </a:r>
-            <a:r>
-              <a:rPr lang="cs-CZ" dirty="0" smtClean="0"/>
-              <a:t> </a:t>
-            </a:r>
-            <a:r>
-              <a:rPr lang="cs-CZ" dirty="0" err="1" smtClean="0"/>
-              <a:t>struct</a:t>
-            </a:r>
-            <a:r>
-              <a:rPr lang="cs-CZ" dirty="0" smtClean="0"/>
-              <a:t> tzn. </a:t>
-            </a:r>
-            <a:r>
-              <a:rPr lang="cs-CZ" dirty="0" err="1" smtClean="0"/>
-              <a:t>int</a:t>
-            </a:r>
-            <a:r>
-              <a:rPr lang="cs-CZ" dirty="0" smtClean="0"/>
-              <a:t> apod.</a:t>
-            </a:r>
-          </a:p>
-          <a:p>
-            <a:pPr fontAlgn="base"/>
-            <a:r>
-              <a:rPr lang="cs-CZ" dirty="0" smtClean="0"/>
-              <a:t>Lze použít </a:t>
-            </a:r>
-            <a:r>
-              <a:rPr lang="cs-CZ" dirty="0" err="1" smtClean="0"/>
-              <a:t>instanceof</a:t>
-            </a:r>
-            <a:r>
-              <a:rPr lang="cs-CZ" dirty="0" smtClean="0"/>
-              <a:t> T</a:t>
-            </a:r>
-          </a:p>
-          <a:p>
-            <a:pPr fontAlgn="base"/>
+            <a:endParaRPr lang="en-US" dirty="0"/>
+          </a:p>
+          <a:p>
+            <a:pPr marL="0" indent="0" fontAlgn="base">
+              <a:buNone/>
+            </a:pPr>
             <a:endParaRPr lang="en-US" dirty="0"/>
           </a:p>
           <a:p>
@@ -9717,7 +10192,7 @@
     </p:custDataLst>
     <p:extLst>
       <p:ext uri="{BB962C8B-B14F-4D97-AF65-F5344CB8AC3E}">
-        <p14:creationId xmlns:p14="http://schemas.microsoft.com/office/powerpoint/2010/main" val="2224911890"/>
+        <p14:creationId xmlns:p14="http://schemas.microsoft.com/office/powerpoint/2010/main" val="375692060"/>
       </p:ext>
     </p:extLst>
   </p:cSld>
@@ -9914,6 +10389,272 @@
           <a:lstStyle/>
           <a:p>
             <a:r>
+              <a:rPr lang="cs-CZ" dirty="0" smtClean="0"/>
+              <a:t>Kolekce</a:t>
+            </a:r>
+            <a:endParaRPr lang="en-US" dirty="0"/>
+          </a:p>
+        </p:txBody>
+      </p:sp>
+      <p:sp>
+        <p:nvSpPr>
+          <p:cNvPr id="5" name="Content Placeholder 4"/>
+          <p:cNvSpPr>
+            <a:spLocks noGrp="1"/>
+          </p:cNvSpPr>
+          <p:nvPr>
+            <p:ph idx="1"/>
+            <p:custDataLst>
+              <p:tags r:id="rId3"/>
+            </p:custDataLst>
+          </p:nvPr>
+        </p:nvSpPr>
+        <p:spPr/>
+        <p:txBody>
+          <a:bodyPr>
+            <a:normAutofit lnSpcReduction="10000"/>
+          </a:bodyPr>
+          <a:lstStyle/>
+          <a:p>
+            <a:pPr fontAlgn="base"/>
+            <a:r>
+              <a:rPr lang="cs-CZ" dirty="0" smtClean="0"/>
+              <a:t>K</a:t>
+            </a:r>
+            <a:r>
+              <a:rPr lang="en-US" dirty="0" err="1" smtClean="0"/>
+              <a:t>olekce</a:t>
+            </a:r>
+            <a:r>
+              <a:rPr lang="en-US" dirty="0" smtClean="0"/>
+              <a:t> z</a:t>
+            </a:r>
+            <a:r>
+              <a:rPr lang="cs-CZ" dirty="0" smtClean="0"/>
+              <a:t>e</a:t>
+            </a:r>
+            <a:r>
+              <a:rPr lang="en-US" dirty="0" smtClean="0"/>
+              <a:t> </a:t>
+            </a:r>
+            <a:r>
+              <a:rPr lang="en-US" dirty="0" err="1"/>
+              <a:t>dvou</a:t>
+            </a:r>
+            <a:r>
+              <a:rPr lang="en-US" dirty="0"/>
+              <a:t> namespace </a:t>
+            </a:r>
+            <a:r>
+              <a:rPr lang="en-US" b="1" dirty="0" err="1"/>
+              <a:t>System.Collections</a:t>
+            </a:r>
+            <a:r>
+              <a:rPr lang="en-US" dirty="0"/>
+              <a:t> a </a:t>
+            </a:r>
+            <a:r>
+              <a:rPr lang="en-US" b="1" dirty="0" err="1"/>
+              <a:t>System.Collections.Generic</a:t>
+            </a:r>
+            <a:r>
+              <a:rPr lang="en-US" dirty="0"/>
+              <a:t> </a:t>
+            </a:r>
+            <a:endParaRPr lang="cs-CZ" dirty="0" smtClean="0"/>
+          </a:p>
+          <a:p>
+            <a:pPr fontAlgn="base"/>
+            <a:r>
+              <a:rPr lang="en-US" dirty="0" err="1" smtClean="0"/>
+              <a:t>pouzivat</a:t>
+            </a:r>
+            <a:r>
+              <a:rPr lang="en-US" dirty="0" smtClean="0"/>
+              <a:t> </a:t>
+            </a:r>
+            <a:r>
+              <a:rPr lang="en-US" dirty="0" err="1"/>
+              <a:t>misto</a:t>
+            </a:r>
+            <a:r>
+              <a:rPr lang="en-US" dirty="0"/>
+              <a:t> </a:t>
+            </a:r>
+            <a:r>
+              <a:rPr lang="en-US" dirty="0" err="1"/>
+              <a:t>ICollection</a:t>
+            </a:r>
+            <a:r>
+              <a:rPr lang="en-US" dirty="0"/>
+              <a:t> </a:t>
+            </a:r>
+            <a:r>
+              <a:rPr lang="en-US" dirty="0" err="1"/>
+              <a:t>nebo</a:t>
+            </a:r>
+            <a:r>
+              <a:rPr lang="en-US" dirty="0"/>
+              <a:t> </a:t>
+            </a:r>
+            <a:r>
+              <a:rPr lang="en-US" dirty="0" err="1"/>
+              <a:t>IList</a:t>
+            </a:r>
+            <a:r>
+              <a:rPr lang="en-US" dirty="0"/>
+              <a:t> </a:t>
+            </a:r>
+            <a:r>
+              <a:rPr lang="cs-CZ" b="1" dirty="0" smtClean="0"/>
+              <a:t>IE</a:t>
+            </a:r>
+            <a:r>
+              <a:rPr lang="en-US" b="1" dirty="0" smtClean="0"/>
+              <a:t>numerable</a:t>
+            </a:r>
+            <a:r>
+              <a:rPr lang="cs-CZ" b="1" dirty="0" smtClean="0"/>
+              <a:t>&lt;&gt;</a:t>
+            </a:r>
+          </a:p>
+          <a:p>
+            <a:pPr fontAlgn="base"/>
+            <a:r>
+              <a:rPr lang="cs-CZ" dirty="0" smtClean="0"/>
+              <a:t>Místo mapy je </a:t>
+            </a:r>
+            <a:r>
+              <a:rPr lang="cs-CZ" dirty="0" err="1" smtClean="0"/>
+              <a:t>IDictionary</a:t>
+            </a:r>
+            <a:r>
+              <a:rPr lang="cs-CZ" dirty="0" smtClean="0"/>
+              <a:t>&lt;,&gt;</a:t>
+            </a:r>
+          </a:p>
+          <a:p>
+            <a:pPr fontAlgn="base"/>
+            <a:r>
+              <a:rPr lang="cs-CZ" dirty="0" smtClean="0"/>
+              <a:t>Do kolekce lze </a:t>
+            </a:r>
+            <a:r>
+              <a:rPr lang="cs-CZ" dirty="0" err="1" smtClean="0"/>
+              <a:t>vkladat</a:t>
+            </a:r>
+            <a:r>
+              <a:rPr lang="cs-CZ" dirty="0" smtClean="0"/>
+              <a:t> </a:t>
+            </a:r>
+            <a:r>
+              <a:rPr lang="cs-CZ" dirty="0" err="1" smtClean="0"/>
+              <a:t>struct</a:t>
+            </a:r>
+            <a:r>
+              <a:rPr lang="cs-CZ" dirty="0" smtClean="0"/>
+              <a:t> tzn. </a:t>
+            </a:r>
+            <a:r>
+              <a:rPr lang="cs-CZ" dirty="0" err="1" smtClean="0"/>
+              <a:t>int</a:t>
+            </a:r>
+            <a:r>
+              <a:rPr lang="cs-CZ" dirty="0" smtClean="0"/>
+              <a:t> apod.</a:t>
+            </a:r>
+          </a:p>
+          <a:p>
+            <a:pPr fontAlgn="base"/>
+            <a:r>
+              <a:rPr lang="cs-CZ" dirty="0" smtClean="0"/>
+              <a:t>Lze použít </a:t>
+            </a:r>
+            <a:r>
+              <a:rPr lang="cs-CZ" dirty="0" err="1" smtClean="0"/>
+              <a:t>instanceof</a:t>
+            </a:r>
+            <a:r>
+              <a:rPr lang="cs-CZ" dirty="0" smtClean="0"/>
+              <a:t> T</a:t>
+            </a:r>
+          </a:p>
+          <a:p>
+            <a:pPr fontAlgn="base"/>
+            <a:endParaRPr lang="en-US" dirty="0"/>
+          </a:p>
+          <a:p>
+            <a:pPr fontAlgn="base"/>
+            <a:endParaRPr lang="pt-BR" dirty="0"/>
+          </a:p>
+          <a:p>
+            <a:pPr fontAlgn="base"/>
+            <a:endParaRPr lang="en-US" dirty="0"/>
+          </a:p>
+        </p:txBody>
+      </p:sp>
+    </p:spTree>
+    <p:custDataLst>
+      <p:tags r:id="rId1"/>
+    </p:custDataLst>
+    <p:extLst>
+      <p:ext uri="{BB962C8B-B14F-4D97-AF65-F5344CB8AC3E}">
+        <p14:creationId xmlns:p14="http://schemas.microsoft.com/office/powerpoint/2010/main" val="2224911890"/>
+      </p:ext>
+    </p:extLst>
+  </p:cSld>
+  <p:clrMapOvr>
+    <a:masterClrMapping/>
+  </p:clrMapOvr>
+  <p:transition spd="slow">
+    <p:wipe dir="d"/>
+  </p:transition>
+  <p:timing>
+    <p:tnLst>
+      <p:par>
+        <p:cTn id="1" dur="indefinite" restart="never" nodeType="tmRoot"/>
+      </p:par>
+    </p:tnLst>
+  </p:timing>
+</p:sld>
+</file>
+
+<file path=ppt/slides/slide21.xml><?xml version="1.0" encoding="utf-8"?>
+<p:sld xmlns:a="http://schemas.openxmlformats.org/drawingml/2006/main" xmlns:r="http://schemas.openxmlformats.org/officeDocument/2006/relationships" xmlns:p="http://schemas.openxmlformats.org/presentationml/2006/main">
+  <p:cSld>
+    <p:spTree>
+      <p:nvGrpSpPr>
+        <p:cNvPr id="1" name=""/>
+        <p:cNvGrpSpPr/>
+        <p:nvPr/>
+      </p:nvGrpSpPr>
+      <p:grpSpPr>
+        <a:xfrm>
+          <a:off x="0" y="0"/>
+          <a:ext cx="0" cy="0"/>
+          <a:chOff x="0" y="0"/>
+          <a:chExt cx="0" cy="0"/>
+        </a:xfrm>
+      </p:grpSpPr>
+      <p:sp>
+        <p:nvSpPr>
+          <p:cNvPr id="2" name="Title 1"/>
+          <p:cNvSpPr>
+            <a:spLocks noGrp="1"/>
+          </p:cNvSpPr>
+          <p:nvPr>
+            <p:ph type="title"/>
+            <p:custDataLst>
+              <p:tags r:id="rId2"/>
+            </p:custDataLst>
+          </p:nvPr>
+        </p:nvSpPr>
+        <p:spPr/>
+        <p:txBody>
+          <a:bodyPr/>
+          <a:lstStyle/>
+          <a:p>
+            <a:r>
               <a:rPr lang="cs-CZ" dirty="0"/>
               <a:t>Komunita</a:t>
             </a:r>
@@ -10023,7 +10764,7 @@
 </p:sld>
 </file>
 
-<file path=ppt/slides/slide21.xml><?xml version="1.0" encoding="utf-8"?>
+<file path=ppt/slides/slide22.xml><?xml version="1.0" encoding="utf-8"?>
 <p:sld xmlns:a="http://schemas.openxmlformats.org/drawingml/2006/main" xmlns:r="http://schemas.openxmlformats.org/officeDocument/2006/relationships" xmlns:p="http://schemas.openxmlformats.org/presentationml/2006/main">
   <p:cSld>
     <p:spTree>
@@ -13399,11 +14140,29 @@
 
 <file path=ppt/tags/tag61.xml><?xml version="1.0" encoding="utf-8"?>
 <p:tagLst xmlns:a="http://schemas.openxmlformats.org/drawingml/2006/main" xmlns:r="http://schemas.openxmlformats.org/officeDocument/2006/relationships" xmlns:p="http://schemas.openxmlformats.org/presentationml/2006/main">
+  <p:tag name="DVSECTIONID" val="QUq8QELArFIgadhH063fpq"/>
+</p:tagLst>
+</file>
+
+<file path=ppt/tags/tag62.xml><?xml version="1.0" encoding="utf-8"?>
+<p:tagLst xmlns:a="http://schemas.openxmlformats.org/drawingml/2006/main" xmlns:r="http://schemas.openxmlformats.org/officeDocument/2006/relationships" xmlns:p="http://schemas.openxmlformats.org/presentationml/2006/main">
+  <p:tag name="DVSHAPEID" val="InkrlxYPS4jAzciXk8ToAM"/>
+</p:tagLst>
+</file>
+
+<file path=ppt/tags/tag63.xml><?xml version="1.0" encoding="utf-8"?>
+<p:tagLst xmlns:a="http://schemas.openxmlformats.org/drawingml/2006/main" xmlns:r="http://schemas.openxmlformats.org/officeDocument/2006/relationships" xmlns:p="http://schemas.openxmlformats.org/presentationml/2006/main">
+  <p:tag name="DVSHAPEID" val="retnMj4SFfqbVIhVK0Rf83"/>
+</p:tagLst>
+</file>
+
+<file path=ppt/tags/tag64.xml><?xml version="1.0" encoding="utf-8"?>
+<p:tagLst xmlns:a="http://schemas.openxmlformats.org/drawingml/2006/main" xmlns:r="http://schemas.openxmlformats.org/officeDocument/2006/relationships" xmlns:p="http://schemas.openxmlformats.org/presentationml/2006/main">
   <p:tag name="DVSECTIONID" val="ezdaKHeWyBnZyZ2cDqRSoa"/>
 </p:tagLst>
 </file>
 
-<file path=ppt/tags/tag62.xml><?xml version="1.0" encoding="utf-8"?>
+<file path=ppt/tags/tag65.xml><?xml version="1.0" encoding="utf-8"?>
 <p:tagLst xmlns:a="http://schemas.openxmlformats.org/drawingml/2006/main" xmlns:r="http://schemas.openxmlformats.org/officeDocument/2006/relationships" xmlns:p="http://schemas.openxmlformats.org/presentationml/2006/main">
   <p:tag name="DVSHAPEID" val="LRMR96J2MVd0CGe2e5htjk"/>
 </p:tagLst>

</xml_diff>